<commit_message>
Some Polish on the Demo
</commit_message>
<xml_diff>
--- a/MOBettaMemory.pptx
+++ b/MOBettaMemory.pptx
@@ -22,8 +22,8 @@
     <p:sldId id="608" r:id="rId13"/>
     <p:sldId id="610" r:id="rId14"/>
     <p:sldId id="611" r:id="rId15"/>
-    <p:sldId id="612" r:id="rId16"/>
-    <p:sldId id="614" r:id="rId17"/>
+    <p:sldId id="614" r:id="rId16"/>
+    <p:sldId id="612" r:id="rId17"/>
     <p:sldId id="615" r:id="rId18"/>
     <p:sldId id="613" r:id="rId19"/>
     <p:sldId id="616" r:id="rId20"/>
@@ -177,8 +177,8 @@
             <p14:sldId id="608"/>
             <p14:sldId id="610"/>
             <p14:sldId id="611"/>
+            <p14:sldId id="614"/>
             <p14:sldId id="612"/>
-            <p14:sldId id="614"/>
             <p14:sldId id="615"/>
             <p14:sldId id="613"/>
             <p14:sldId id="616"/>
@@ -813,6 +813,716 @@
     <p:extLst>
       <p:ext uri="{BB962C8B-B14F-4D97-AF65-F5344CB8AC3E}">
         <p14:creationId xmlns:p14="http://schemas.microsoft.com/office/powerpoint/2010/main" val="2301862878"/>
+      </p:ext>
+    </p:extLst>
+  </p:cSld>
+  <p:clrMapOvr>
+    <a:masterClrMapping/>
+  </p:clrMapOvr>
+</p:notes>
+</file>
+
+<file path=ppt/notesSlides/notesSlide2.xml><?xml version="1.0" encoding="utf-8"?>
+<p:notes xmlns:a="http://schemas.openxmlformats.org/drawingml/2006/main" xmlns:r="http://schemas.openxmlformats.org/officeDocument/2006/relationships" xmlns:p="http://schemas.openxmlformats.org/presentationml/2006/main">
+  <p:cSld>
+    <p:spTree>
+      <p:nvGrpSpPr>
+        <p:cNvPr id="1" name=""/>
+        <p:cNvGrpSpPr/>
+        <p:nvPr/>
+      </p:nvGrpSpPr>
+      <p:grpSpPr>
+        <a:xfrm>
+          <a:off x="0" y="0"/>
+          <a:ext cx="0" cy="0"/>
+          <a:chOff x="0" y="0"/>
+          <a:chExt cx="0" cy="0"/>
+        </a:xfrm>
+      </p:grpSpPr>
+      <p:sp>
+        <p:nvSpPr>
+          <p:cNvPr id="2" name="Slide Image Placeholder 1"/>
+          <p:cNvSpPr>
+            <a:spLocks noGrp="1" noRot="1" noChangeAspect="1"/>
+          </p:cNvSpPr>
+          <p:nvPr>
+            <p:ph type="sldImg"/>
+          </p:nvPr>
+        </p:nvSpPr>
+        <p:spPr/>
+      </p:sp>
+      <p:sp>
+        <p:nvSpPr>
+          <p:cNvPr id="3" name="Notes Placeholder 2"/>
+          <p:cNvSpPr>
+            <a:spLocks noGrp="1"/>
+          </p:cNvSpPr>
+          <p:nvPr>
+            <p:ph type="body" idx="1"/>
+          </p:nvPr>
+        </p:nvSpPr>
+        <p:spPr/>
+        <p:txBody>
+          <a:bodyPr/>
+          <a:lstStyle/>
+          <a:p>
+            <a:r>
+              <a:rPr lang="en-US" dirty="0" smtClean="0"/>
+              <a:t>You</a:t>
+            </a:r>
+            <a:r>
+              <a:rPr lang="en-US" baseline="0" dirty="0" smtClean="0"/>
+              <a:t> might ask why have three buckets.  These end up being the ‘counters’ for how many times that a reference has survived.</a:t>
+            </a:r>
+          </a:p>
+          <a:p>
+            <a:r>
+              <a:rPr lang="en-US" dirty="0" smtClean="0"/>
+              <a:t>You can control if the GC will run concurrent with the </a:t>
+            </a:r>
+            <a:r>
+              <a:rPr lang="en-US" dirty="0" err="1" smtClean="0"/>
+              <a:t>gcConcurrent</a:t>
+            </a:r>
+            <a:r>
+              <a:rPr lang="en-US" dirty="0" smtClean="0"/>
+              <a:t> element via app </a:t>
+            </a:r>
+            <a:r>
+              <a:rPr lang="en-US" dirty="0" err="1" smtClean="0"/>
+              <a:t>config</a:t>
+            </a:r>
+            <a:r>
+              <a:rPr lang="en-US" dirty="0" smtClean="0"/>
+              <a:t>.</a:t>
+            </a:r>
+            <a:endParaRPr lang="en-US" dirty="0"/>
+          </a:p>
+        </p:txBody>
+      </p:sp>
+      <p:sp>
+        <p:nvSpPr>
+          <p:cNvPr id="4" name="Date Placeholder 3"/>
+          <p:cNvSpPr>
+            <a:spLocks noGrp="1"/>
+          </p:cNvSpPr>
+          <p:nvPr>
+            <p:ph type="dt" idx="10"/>
+          </p:nvPr>
+        </p:nvSpPr>
+        <p:spPr/>
+        <p:txBody>
+          <a:bodyPr/>
+          <a:lstStyle/>
+          <a:p>
+            <a:endParaRPr lang="en-US" dirty="0"/>
+          </a:p>
+        </p:txBody>
+      </p:sp>
+      <p:sp>
+        <p:nvSpPr>
+          <p:cNvPr id="5" name="Slide Number Placeholder 4"/>
+          <p:cNvSpPr>
+            <a:spLocks noGrp="1"/>
+          </p:cNvSpPr>
+          <p:nvPr>
+            <p:ph type="sldNum" sz="quarter" idx="11"/>
+          </p:nvPr>
+        </p:nvSpPr>
+        <p:spPr/>
+        <p:txBody>
+          <a:bodyPr/>
+          <a:lstStyle/>
+          <a:p>
+            <a:fld id="{FF24F6AD-FC3F-4814-8DB0-D20057A8ECF6}" type="slidenum">
+              <a:rPr lang="en-US" smtClean="0"/>
+              <a:t>5</a:t>
+            </a:fld>
+            <a:endParaRPr lang="en-US" dirty="0"/>
+          </a:p>
+        </p:txBody>
+      </p:sp>
+    </p:spTree>
+    <p:extLst>
+      <p:ext uri="{BB962C8B-B14F-4D97-AF65-F5344CB8AC3E}">
+        <p14:creationId xmlns:p14="http://schemas.microsoft.com/office/powerpoint/2010/main" val="2259027328"/>
+      </p:ext>
+    </p:extLst>
+  </p:cSld>
+  <p:clrMapOvr>
+    <a:masterClrMapping/>
+  </p:clrMapOvr>
+</p:notes>
+</file>
+
+<file path=ppt/notesSlides/notesSlide3.xml><?xml version="1.0" encoding="utf-8"?>
+<p:notes xmlns:a="http://schemas.openxmlformats.org/drawingml/2006/main" xmlns:r="http://schemas.openxmlformats.org/officeDocument/2006/relationships" xmlns:p="http://schemas.openxmlformats.org/presentationml/2006/main">
+  <p:cSld>
+    <p:spTree>
+      <p:nvGrpSpPr>
+        <p:cNvPr id="1" name=""/>
+        <p:cNvGrpSpPr/>
+        <p:nvPr/>
+      </p:nvGrpSpPr>
+      <p:grpSpPr>
+        <a:xfrm>
+          <a:off x="0" y="0"/>
+          <a:ext cx="0" cy="0"/>
+          <a:chOff x="0" y="0"/>
+          <a:chExt cx="0" cy="0"/>
+        </a:xfrm>
+      </p:grpSpPr>
+      <p:sp>
+        <p:nvSpPr>
+          <p:cNvPr id="2" name="Slide Image Placeholder 1"/>
+          <p:cNvSpPr>
+            <a:spLocks noGrp="1" noRot="1" noChangeAspect="1"/>
+          </p:cNvSpPr>
+          <p:nvPr>
+            <p:ph type="sldImg"/>
+          </p:nvPr>
+        </p:nvSpPr>
+        <p:spPr/>
+      </p:sp>
+      <p:sp>
+        <p:nvSpPr>
+          <p:cNvPr id="3" name="Notes Placeholder 2"/>
+          <p:cNvSpPr>
+            <a:spLocks noGrp="1"/>
+          </p:cNvSpPr>
+          <p:nvPr>
+            <p:ph type="body" idx="1"/>
+          </p:nvPr>
+        </p:nvSpPr>
+        <p:spPr/>
+        <p:txBody>
+          <a:bodyPr/>
+          <a:lstStyle/>
+          <a:p>
+            <a:r>
+              <a:rPr lang="en-US" dirty="0" smtClean="0"/>
+              <a:t>This video</a:t>
+            </a:r>
+            <a:r>
+              <a:rPr lang="en-US" baseline="0" dirty="0" smtClean="0"/>
+              <a:t> is a pretty good commentary on when you might choose to do some things like replace the implementation of the FCL.  </a:t>
+            </a:r>
+            <a:endParaRPr lang="en-US" dirty="0"/>
+          </a:p>
+        </p:txBody>
+      </p:sp>
+      <p:sp>
+        <p:nvSpPr>
+          <p:cNvPr id="4" name="Date Placeholder 3"/>
+          <p:cNvSpPr>
+            <a:spLocks noGrp="1"/>
+          </p:cNvSpPr>
+          <p:nvPr>
+            <p:ph type="dt" idx="10"/>
+          </p:nvPr>
+        </p:nvSpPr>
+        <p:spPr/>
+        <p:txBody>
+          <a:bodyPr/>
+          <a:lstStyle/>
+          <a:p>
+            <a:endParaRPr lang="en-US" dirty="0"/>
+          </a:p>
+        </p:txBody>
+      </p:sp>
+      <p:sp>
+        <p:nvSpPr>
+          <p:cNvPr id="5" name="Slide Number Placeholder 4"/>
+          <p:cNvSpPr>
+            <a:spLocks noGrp="1"/>
+          </p:cNvSpPr>
+          <p:nvPr>
+            <p:ph type="sldNum" sz="quarter" idx="11"/>
+          </p:nvPr>
+        </p:nvSpPr>
+        <p:spPr/>
+        <p:txBody>
+          <a:bodyPr/>
+          <a:lstStyle/>
+          <a:p>
+            <a:fld id="{FF24F6AD-FC3F-4814-8DB0-D20057A8ECF6}" type="slidenum">
+              <a:rPr lang="en-US" smtClean="0"/>
+              <a:t>7</a:t>
+            </a:fld>
+            <a:endParaRPr lang="en-US" dirty="0"/>
+          </a:p>
+        </p:txBody>
+      </p:sp>
+    </p:spTree>
+    <p:extLst>
+      <p:ext uri="{BB962C8B-B14F-4D97-AF65-F5344CB8AC3E}">
+        <p14:creationId xmlns:p14="http://schemas.microsoft.com/office/powerpoint/2010/main" val="1884413760"/>
+      </p:ext>
+    </p:extLst>
+  </p:cSld>
+  <p:clrMapOvr>
+    <a:masterClrMapping/>
+  </p:clrMapOvr>
+</p:notes>
+</file>
+
+<file path=ppt/notesSlides/notesSlide4.xml><?xml version="1.0" encoding="utf-8"?>
+<p:notes xmlns:a="http://schemas.openxmlformats.org/drawingml/2006/main" xmlns:r="http://schemas.openxmlformats.org/officeDocument/2006/relationships" xmlns:p="http://schemas.openxmlformats.org/presentationml/2006/main">
+  <p:cSld>
+    <p:spTree>
+      <p:nvGrpSpPr>
+        <p:cNvPr id="1" name=""/>
+        <p:cNvGrpSpPr/>
+        <p:nvPr/>
+      </p:nvGrpSpPr>
+      <p:grpSpPr>
+        <a:xfrm>
+          <a:off x="0" y="0"/>
+          <a:ext cx="0" cy="0"/>
+          <a:chOff x="0" y="0"/>
+          <a:chExt cx="0" cy="0"/>
+        </a:xfrm>
+      </p:grpSpPr>
+      <p:sp>
+        <p:nvSpPr>
+          <p:cNvPr id="2" name="Slide Image Placeholder 1"/>
+          <p:cNvSpPr>
+            <a:spLocks noGrp="1" noRot="1" noChangeAspect="1"/>
+          </p:cNvSpPr>
+          <p:nvPr>
+            <p:ph type="sldImg"/>
+          </p:nvPr>
+        </p:nvSpPr>
+        <p:spPr/>
+      </p:sp>
+      <p:sp>
+        <p:nvSpPr>
+          <p:cNvPr id="3" name="Notes Placeholder 2"/>
+          <p:cNvSpPr>
+            <a:spLocks noGrp="1"/>
+          </p:cNvSpPr>
+          <p:nvPr>
+            <p:ph type="body" idx="1"/>
+          </p:nvPr>
+        </p:nvSpPr>
+        <p:spPr/>
+        <p:txBody>
+          <a:bodyPr/>
+          <a:lstStyle/>
+          <a:p>
+            <a:r>
+              <a:rPr lang="en-US" dirty="0" smtClean="0"/>
+              <a:t>We</a:t>
+            </a:r>
+            <a:r>
+              <a:rPr lang="en-US" baseline="0" dirty="0" smtClean="0"/>
+              <a:t> won’t be discussing GC Events today, but they are a powerful approach to taking ownership of the memory allocation in your apps.</a:t>
+            </a:r>
+            <a:endParaRPr lang="en-US" dirty="0"/>
+          </a:p>
+        </p:txBody>
+      </p:sp>
+      <p:sp>
+        <p:nvSpPr>
+          <p:cNvPr id="4" name="Date Placeholder 3"/>
+          <p:cNvSpPr>
+            <a:spLocks noGrp="1"/>
+          </p:cNvSpPr>
+          <p:nvPr>
+            <p:ph type="dt" idx="10"/>
+          </p:nvPr>
+        </p:nvSpPr>
+        <p:spPr/>
+        <p:txBody>
+          <a:bodyPr/>
+          <a:lstStyle/>
+          <a:p>
+            <a:endParaRPr lang="en-US" dirty="0"/>
+          </a:p>
+        </p:txBody>
+      </p:sp>
+      <p:sp>
+        <p:nvSpPr>
+          <p:cNvPr id="5" name="Slide Number Placeholder 4"/>
+          <p:cNvSpPr>
+            <a:spLocks noGrp="1"/>
+          </p:cNvSpPr>
+          <p:nvPr>
+            <p:ph type="sldNum" sz="quarter" idx="11"/>
+          </p:nvPr>
+        </p:nvSpPr>
+        <p:spPr/>
+        <p:txBody>
+          <a:bodyPr/>
+          <a:lstStyle/>
+          <a:p>
+            <a:fld id="{FF24F6AD-FC3F-4814-8DB0-D20057A8ECF6}" type="slidenum">
+              <a:rPr lang="en-US" smtClean="0"/>
+              <a:t>10</a:t>
+            </a:fld>
+            <a:endParaRPr lang="en-US" dirty="0"/>
+          </a:p>
+        </p:txBody>
+      </p:sp>
+    </p:spTree>
+    <p:extLst>
+      <p:ext uri="{BB962C8B-B14F-4D97-AF65-F5344CB8AC3E}">
+        <p14:creationId xmlns:p14="http://schemas.microsoft.com/office/powerpoint/2010/main" val="2376798910"/>
+      </p:ext>
+    </p:extLst>
+  </p:cSld>
+  <p:clrMapOvr>
+    <a:masterClrMapping/>
+  </p:clrMapOvr>
+</p:notes>
+</file>
+
+<file path=ppt/notesSlides/notesSlide5.xml><?xml version="1.0" encoding="utf-8"?>
+<p:notes xmlns:a="http://schemas.openxmlformats.org/drawingml/2006/main" xmlns:r="http://schemas.openxmlformats.org/officeDocument/2006/relationships" xmlns:p="http://schemas.openxmlformats.org/presentationml/2006/main">
+  <p:cSld>
+    <p:spTree>
+      <p:nvGrpSpPr>
+        <p:cNvPr id="1" name=""/>
+        <p:cNvGrpSpPr/>
+        <p:nvPr/>
+      </p:nvGrpSpPr>
+      <p:grpSpPr>
+        <a:xfrm>
+          <a:off x="0" y="0"/>
+          <a:ext cx="0" cy="0"/>
+          <a:chOff x="0" y="0"/>
+          <a:chExt cx="0" cy="0"/>
+        </a:xfrm>
+      </p:grpSpPr>
+      <p:sp>
+        <p:nvSpPr>
+          <p:cNvPr id="2" name="Slide Image Placeholder 1"/>
+          <p:cNvSpPr>
+            <a:spLocks noGrp="1" noRot="1" noChangeAspect="1"/>
+          </p:cNvSpPr>
+          <p:nvPr>
+            <p:ph type="sldImg"/>
+          </p:nvPr>
+        </p:nvSpPr>
+        <p:spPr/>
+      </p:sp>
+      <p:sp>
+        <p:nvSpPr>
+          <p:cNvPr id="3" name="Notes Placeholder 2"/>
+          <p:cNvSpPr>
+            <a:spLocks noGrp="1"/>
+          </p:cNvSpPr>
+          <p:nvPr>
+            <p:ph type="body" idx="1"/>
+          </p:nvPr>
+        </p:nvSpPr>
+        <p:spPr/>
+        <p:txBody>
+          <a:bodyPr/>
+          <a:lstStyle/>
+          <a:p>
+            <a:r>
+              <a:rPr lang="en-US" dirty="0" smtClean="0"/>
+              <a:t>I want to start with a small demonstration</a:t>
+            </a:r>
+            <a:r>
+              <a:rPr lang="en-US" baseline="0" dirty="0" smtClean="0"/>
+              <a:t> of </a:t>
+            </a:r>
+            <a:r>
+              <a:rPr lang="en-US" baseline="0" dirty="0" err="1" smtClean="0"/>
+              <a:t>PerfMon</a:t>
+            </a:r>
+            <a:r>
+              <a:rPr lang="en-US" baseline="0" dirty="0" smtClean="0"/>
+              <a:t>.  There is a Data Collector template in the root directory of the </a:t>
+            </a:r>
+            <a:r>
+              <a:rPr lang="en-US" baseline="0" dirty="0" err="1" smtClean="0"/>
+              <a:t>Github</a:t>
+            </a:r>
+            <a:r>
+              <a:rPr lang="en-US" baseline="0" dirty="0" smtClean="0"/>
+              <a:t> repo for these demos.</a:t>
+            </a:r>
+            <a:endParaRPr lang="en-US" dirty="0"/>
+          </a:p>
+        </p:txBody>
+      </p:sp>
+      <p:sp>
+        <p:nvSpPr>
+          <p:cNvPr id="4" name="Date Placeholder 3"/>
+          <p:cNvSpPr>
+            <a:spLocks noGrp="1"/>
+          </p:cNvSpPr>
+          <p:nvPr>
+            <p:ph type="dt" idx="10"/>
+          </p:nvPr>
+        </p:nvSpPr>
+        <p:spPr/>
+        <p:txBody>
+          <a:bodyPr/>
+          <a:lstStyle/>
+          <a:p>
+            <a:endParaRPr lang="en-US" dirty="0"/>
+          </a:p>
+        </p:txBody>
+      </p:sp>
+      <p:sp>
+        <p:nvSpPr>
+          <p:cNvPr id="5" name="Slide Number Placeholder 4"/>
+          <p:cNvSpPr>
+            <a:spLocks noGrp="1"/>
+          </p:cNvSpPr>
+          <p:nvPr>
+            <p:ph type="sldNum" sz="quarter" idx="11"/>
+          </p:nvPr>
+        </p:nvSpPr>
+        <p:spPr/>
+        <p:txBody>
+          <a:bodyPr/>
+          <a:lstStyle/>
+          <a:p>
+            <a:fld id="{FF24F6AD-FC3F-4814-8DB0-D20057A8ECF6}" type="slidenum">
+              <a:rPr lang="en-US" smtClean="0"/>
+              <a:t>12</a:t>
+            </a:fld>
+            <a:endParaRPr lang="en-US" dirty="0"/>
+          </a:p>
+        </p:txBody>
+      </p:sp>
+    </p:spTree>
+    <p:extLst>
+      <p:ext uri="{BB962C8B-B14F-4D97-AF65-F5344CB8AC3E}">
+        <p14:creationId xmlns:p14="http://schemas.microsoft.com/office/powerpoint/2010/main" val="1476279844"/>
+      </p:ext>
+    </p:extLst>
+  </p:cSld>
+  <p:clrMapOvr>
+    <a:masterClrMapping/>
+  </p:clrMapOvr>
+</p:notes>
+</file>
+
+<file path=ppt/notesSlides/notesSlide6.xml><?xml version="1.0" encoding="utf-8"?>
+<p:notes xmlns:a="http://schemas.openxmlformats.org/drawingml/2006/main" xmlns:r="http://schemas.openxmlformats.org/officeDocument/2006/relationships" xmlns:p="http://schemas.openxmlformats.org/presentationml/2006/main">
+  <p:cSld>
+    <p:spTree>
+      <p:nvGrpSpPr>
+        <p:cNvPr id="1" name=""/>
+        <p:cNvGrpSpPr/>
+        <p:nvPr/>
+      </p:nvGrpSpPr>
+      <p:grpSpPr>
+        <a:xfrm>
+          <a:off x="0" y="0"/>
+          <a:ext cx="0" cy="0"/>
+          <a:chOff x="0" y="0"/>
+          <a:chExt cx="0" cy="0"/>
+        </a:xfrm>
+      </p:grpSpPr>
+      <p:sp>
+        <p:nvSpPr>
+          <p:cNvPr id="2" name="Slide Image Placeholder 1"/>
+          <p:cNvSpPr>
+            <a:spLocks noGrp="1" noRot="1" noChangeAspect="1"/>
+          </p:cNvSpPr>
+          <p:nvPr>
+            <p:ph type="sldImg"/>
+          </p:nvPr>
+        </p:nvSpPr>
+        <p:spPr/>
+      </p:sp>
+      <p:sp>
+        <p:nvSpPr>
+          <p:cNvPr id="3" name="Notes Placeholder 2"/>
+          <p:cNvSpPr>
+            <a:spLocks noGrp="1"/>
+          </p:cNvSpPr>
+          <p:nvPr>
+            <p:ph type="body" idx="1"/>
+          </p:nvPr>
+        </p:nvSpPr>
+        <p:spPr/>
+        <p:txBody>
+          <a:bodyPr/>
+          <a:lstStyle/>
+          <a:p>
+            <a:r>
+              <a:rPr lang="en-US" dirty="0" smtClean="0"/>
+              <a:t>While MS built</a:t>
+            </a:r>
+            <a:r>
+              <a:rPr lang="en-US" baseline="0" dirty="0" smtClean="0"/>
+              <a:t> this feature for their own purposes in solving problems in WPF and the compiler, we can also use it to our advantage when presented the right use-case.</a:t>
+            </a:r>
+          </a:p>
+          <a:p>
+            <a:r>
+              <a:rPr lang="en-US" baseline="0" dirty="0" smtClean="0"/>
+              <a:t>Look into dangling Events </a:t>
+            </a:r>
+            <a:endParaRPr lang="en-US" dirty="0"/>
+          </a:p>
+        </p:txBody>
+      </p:sp>
+      <p:sp>
+        <p:nvSpPr>
+          <p:cNvPr id="4" name="Date Placeholder 3"/>
+          <p:cNvSpPr>
+            <a:spLocks noGrp="1"/>
+          </p:cNvSpPr>
+          <p:nvPr>
+            <p:ph type="dt" idx="10"/>
+          </p:nvPr>
+        </p:nvSpPr>
+        <p:spPr/>
+        <p:txBody>
+          <a:bodyPr/>
+          <a:lstStyle/>
+          <a:p>
+            <a:endParaRPr lang="en-US" dirty="0"/>
+          </a:p>
+        </p:txBody>
+      </p:sp>
+      <p:sp>
+        <p:nvSpPr>
+          <p:cNvPr id="5" name="Slide Number Placeholder 4"/>
+          <p:cNvSpPr>
+            <a:spLocks noGrp="1"/>
+          </p:cNvSpPr>
+          <p:nvPr>
+            <p:ph type="sldNum" sz="quarter" idx="11"/>
+          </p:nvPr>
+        </p:nvSpPr>
+        <p:spPr/>
+        <p:txBody>
+          <a:bodyPr/>
+          <a:lstStyle/>
+          <a:p>
+            <a:fld id="{FF24F6AD-FC3F-4814-8DB0-D20057A8ECF6}" type="slidenum">
+              <a:rPr lang="en-US" smtClean="0"/>
+              <a:t>20</a:t>
+            </a:fld>
+            <a:endParaRPr lang="en-US" dirty="0"/>
+          </a:p>
+        </p:txBody>
+      </p:sp>
+    </p:spTree>
+    <p:extLst>
+      <p:ext uri="{BB962C8B-B14F-4D97-AF65-F5344CB8AC3E}">
+        <p14:creationId xmlns:p14="http://schemas.microsoft.com/office/powerpoint/2010/main" val="3046359067"/>
+      </p:ext>
+    </p:extLst>
+  </p:cSld>
+  <p:clrMapOvr>
+    <a:masterClrMapping/>
+  </p:clrMapOvr>
+</p:notes>
+</file>
+
+<file path=ppt/notesSlides/notesSlide7.xml><?xml version="1.0" encoding="utf-8"?>
+<p:notes xmlns:a="http://schemas.openxmlformats.org/drawingml/2006/main" xmlns:r="http://schemas.openxmlformats.org/officeDocument/2006/relationships" xmlns:p="http://schemas.openxmlformats.org/presentationml/2006/main">
+  <p:cSld>
+    <p:spTree>
+      <p:nvGrpSpPr>
+        <p:cNvPr id="1" name=""/>
+        <p:cNvGrpSpPr/>
+        <p:nvPr/>
+      </p:nvGrpSpPr>
+      <p:grpSpPr>
+        <a:xfrm>
+          <a:off x="0" y="0"/>
+          <a:ext cx="0" cy="0"/>
+          <a:chOff x="0" y="0"/>
+          <a:chExt cx="0" cy="0"/>
+        </a:xfrm>
+      </p:grpSpPr>
+      <p:sp>
+        <p:nvSpPr>
+          <p:cNvPr id="2" name="Slide Image Placeholder 1"/>
+          <p:cNvSpPr>
+            <a:spLocks noGrp="1" noRot="1" noChangeAspect="1"/>
+          </p:cNvSpPr>
+          <p:nvPr>
+            <p:ph type="sldImg"/>
+          </p:nvPr>
+        </p:nvSpPr>
+        <p:spPr/>
+      </p:sp>
+      <p:sp>
+        <p:nvSpPr>
+          <p:cNvPr id="3" name="Notes Placeholder 2"/>
+          <p:cNvSpPr>
+            <a:spLocks noGrp="1"/>
+          </p:cNvSpPr>
+          <p:nvPr>
+            <p:ph type="body" idx="1"/>
+          </p:nvPr>
+        </p:nvSpPr>
+        <p:spPr/>
+        <p:txBody>
+          <a:bodyPr/>
+          <a:lstStyle/>
+          <a:p>
+            <a:r>
+              <a:rPr lang="en-US" dirty="0" smtClean="0"/>
+              <a:t>I hope you do not come</a:t>
+            </a:r>
+            <a:r>
+              <a:rPr lang="en-US" baseline="0" dirty="0" smtClean="0"/>
+              <a:t> away from this with paranoia about the garbage collector; it is generally excellent without any fine-tuning</a:t>
+            </a:r>
+            <a:endParaRPr lang="en-US" dirty="0"/>
+          </a:p>
+        </p:txBody>
+      </p:sp>
+      <p:sp>
+        <p:nvSpPr>
+          <p:cNvPr id="4" name="Date Placeholder 3"/>
+          <p:cNvSpPr>
+            <a:spLocks noGrp="1"/>
+          </p:cNvSpPr>
+          <p:nvPr>
+            <p:ph type="dt" idx="10"/>
+          </p:nvPr>
+        </p:nvSpPr>
+        <p:spPr/>
+        <p:txBody>
+          <a:bodyPr/>
+          <a:lstStyle/>
+          <a:p>
+            <a:endParaRPr lang="en-US" dirty="0"/>
+          </a:p>
+        </p:txBody>
+      </p:sp>
+      <p:sp>
+        <p:nvSpPr>
+          <p:cNvPr id="5" name="Slide Number Placeholder 4"/>
+          <p:cNvSpPr>
+            <a:spLocks noGrp="1"/>
+          </p:cNvSpPr>
+          <p:nvPr>
+            <p:ph type="sldNum" sz="quarter" idx="11"/>
+          </p:nvPr>
+        </p:nvSpPr>
+        <p:spPr/>
+        <p:txBody>
+          <a:bodyPr/>
+          <a:lstStyle/>
+          <a:p>
+            <a:fld id="{FF24F6AD-FC3F-4814-8DB0-D20057A8ECF6}" type="slidenum">
+              <a:rPr lang="en-US" smtClean="0"/>
+              <a:t>21</a:t>
+            </a:fld>
+            <a:endParaRPr lang="en-US" dirty="0"/>
+          </a:p>
+        </p:txBody>
+      </p:sp>
+    </p:spTree>
+    <p:extLst>
+      <p:ext uri="{BB962C8B-B14F-4D97-AF65-F5344CB8AC3E}">
+        <p14:creationId xmlns:p14="http://schemas.microsoft.com/office/powerpoint/2010/main" val="2658067345"/>
       </p:ext>
     </p:extLst>
   </p:cSld>
@@ -4280,14 +4990,49 @@
           <a:p>
             <a:r>
               <a:rPr lang="en-US" dirty="0" smtClean="0"/>
-              <a:t>GC Events</a:t>
-            </a:r>
-          </a:p>
-          <a:p>
+              <a:t>GC </a:t>
+            </a:r>
             <a:r>
               <a:rPr lang="en-US" dirty="0" smtClean="0"/>
-              <a:t>GC Performance Counters</a:t>
-            </a:r>
+              <a:t>Events</a:t>
+            </a:r>
+          </a:p>
+          <a:p>
+            <a:pPr lvl="1"/>
+            <a:r>
+              <a:rPr lang="en-US" dirty="0" smtClean="0"/>
+              <a:t>Useful when you are managing large sets of objects.</a:t>
+            </a:r>
+          </a:p>
+          <a:p>
+            <a:pPr lvl="2"/>
+            <a:r>
+              <a:rPr lang="en-US" dirty="0">
+                <a:hlinkClick r:id="rId3"/>
+              </a:rPr>
+              <a:t>https://docs.microsoft.com/en-us/dotnet/standard/garbage-collection/notifications</a:t>
+            </a:r>
+            <a:endParaRPr lang="en-US" dirty="0" smtClean="0"/>
+          </a:p>
+          <a:p>
+            <a:r>
+              <a:rPr lang="en-US" dirty="0" smtClean="0"/>
+              <a:t>GC Performance </a:t>
+            </a:r>
+            <a:r>
+              <a:rPr lang="en-US" dirty="0" smtClean="0"/>
+              <a:t>Counters</a:t>
+            </a:r>
+          </a:p>
+          <a:p>
+            <a:pPr lvl="2"/>
+            <a:r>
+              <a:rPr lang="en-US" dirty="0">
+                <a:hlinkClick r:id="rId4"/>
+              </a:rPr>
+              <a:t>https://docs.microsoft.com/en-us/dotnet/framework/debug-trace-profile/performance-counters#memory</a:t>
+            </a:r>
+            <a:endParaRPr lang="en-US" dirty="0" smtClean="0"/>
           </a:p>
         </p:txBody>
       </p:sp>
@@ -4532,7 +5277,7 @@
           <a:p>
             <a:r>
               <a:rPr lang="en-US" dirty="0" smtClean="0"/>
-              <a:t>Diagnostics</a:t>
+              <a:t>Good Counters for Troubleshooting</a:t>
             </a:r>
             <a:endParaRPr lang="en-US" dirty="0"/>
           </a:p>
@@ -4553,25 +5298,71 @@
           <a:bodyPr/>
           <a:lstStyle/>
           <a:p>
-            <a:pPr marL="0" indent="0" algn="ctr">
-              <a:buNone/>
-            </a:pPr>
-            <a:r>
-              <a:rPr lang="en-US" dirty="0" smtClean="0"/>
-              <a:t>Performance Counters Demo</a:t>
-            </a:r>
-          </a:p>
-          <a:p>
-            <a:pPr marL="0" indent="0" algn="ctr">
-              <a:buNone/>
-            </a:pPr>
-            <a:r>
-              <a:rPr lang="en-US" sz="1800" dirty="0">
-                <a:hlinkClick r:id="rId2"/>
-              </a:rPr>
-              <a:t>https://docs.microsoft.com/en-us/dotnet/framework/debug-trace-profile/performance-counters#memory</a:t>
-            </a:r>
-            <a:endParaRPr lang="en-US" sz="1800" dirty="0"/>
+            <a:r>
+              <a:rPr lang="en-US" b="1" dirty="0"/>
+              <a:t>% Time in </a:t>
+            </a:r>
+            <a:r>
+              <a:rPr lang="en-US" b="1" dirty="0" smtClean="0"/>
+              <a:t>GC</a:t>
+            </a:r>
+          </a:p>
+          <a:p>
+            <a:r>
+              <a:rPr lang="en-US" b="1" dirty="0"/>
+              <a:t>Allocated </a:t>
+            </a:r>
+            <a:r>
+              <a:rPr lang="en-US" b="1" dirty="0" smtClean="0"/>
+              <a:t>Bytes/second</a:t>
+            </a:r>
+          </a:p>
+          <a:p>
+            <a:r>
+              <a:rPr lang="en-US" b="1" dirty="0"/>
+              <a:t>Large Object Heap </a:t>
+            </a:r>
+            <a:r>
+              <a:rPr lang="en-US" b="1" dirty="0" smtClean="0"/>
+              <a:t>size</a:t>
+            </a:r>
+          </a:p>
+          <a:p>
+            <a:r>
+              <a:rPr lang="en-US" b="1" dirty="0"/>
+              <a:t>Gen 0 heap </a:t>
+            </a:r>
+            <a:r>
+              <a:rPr lang="en-US" b="1" dirty="0" smtClean="0"/>
+              <a:t>size</a:t>
+            </a:r>
+          </a:p>
+          <a:p>
+            <a:r>
+              <a:rPr lang="en-US" b="1" dirty="0"/>
+              <a:t>Gen 1 heap </a:t>
+            </a:r>
+            <a:r>
+              <a:rPr lang="en-US" b="1" dirty="0" smtClean="0"/>
+              <a:t>size</a:t>
+            </a:r>
+          </a:p>
+          <a:p>
+            <a:r>
+              <a:rPr lang="en-US" b="1" dirty="0"/>
+              <a:t>Gen 2 heap </a:t>
+            </a:r>
+            <a:r>
+              <a:rPr lang="en-US" b="1" dirty="0" smtClean="0"/>
+              <a:t>size</a:t>
+            </a:r>
+          </a:p>
+          <a:p>
+            <a:r>
+              <a:rPr lang="en-US" b="1" dirty="0"/>
+              <a:t># Bytes in all Heaps</a:t>
+            </a:r>
+            <a:endParaRPr lang="en-US" dirty="0"/>
           </a:p>
         </p:txBody>
       </p:sp>
@@ -4602,7 +5393,7 @@
     </p:spTree>
     <p:extLst>
       <p:ext uri="{BB962C8B-B14F-4D97-AF65-F5344CB8AC3E}">
-        <p14:creationId xmlns:p14="http://schemas.microsoft.com/office/powerpoint/2010/main" val="2997955491"/>
+        <p14:creationId xmlns:p14="http://schemas.microsoft.com/office/powerpoint/2010/main" val="896516955"/>
       </p:ext>
     </p:extLst>
   </p:cSld>
@@ -4654,7 +5445,7 @@
           <a:p>
             <a:r>
               <a:rPr lang="en-US" dirty="0" smtClean="0"/>
-              <a:t>Good Counters for Troubleshooting</a:t>
+              <a:t>Diagnostics</a:t>
             </a:r>
             <a:endParaRPr lang="en-US" dirty="0"/>
           </a:p>
@@ -4675,71 +5466,25 @@
           <a:bodyPr/>
           <a:lstStyle/>
           <a:p>
-            <a:r>
-              <a:rPr lang="en-US" b="1" dirty="0"/>
-              <a:t>% Time in </a:t>
-            </a:r>
-            <a:r>
-              <a:rPr lang="en-US" b="1" dirty="0" smtClean="0"/>
-              <a:t>GC</a:t>
-            </a:r>
-          </a:p>
-          <a:p>
-            <a:r>
-              <a:rPr lang="en-US" b="1" dirty="0"/>
-              <a:t>Allocated </a:t>
-            </a:r>
-            <a:r>
-              <a:rPr lang="en-US" b="1" dirty="0" smtClean="0"/>
-              <a:t>Bytes/second</a:t>
-            </a:r>
-          </a:p>
-          <a:p>
-            <a:r>
-              <a:rPr lang="en-US" b="1" dirty="0"/>
-              <a:t>Large Object Heap </a:t>
-            </a:r>
-            <a:r>
-              <a:rPr lang="en-US" b="1" dirty="0" smtClean="0"/>
-              <a:t>size</a:t>
-            </a:r>
-          </a:p>
-          <a:p>
-            <a:r>
-              <a:rPr lang="en-US" b="1" dirty="0"/>
-              <a:t>Gen 0 heap </a:t>
-            </a:r>
-            <a:r>
-              <a:rPr lang="en-US" b="1" dirty="0" smtClean="0"/>
-              <a:t>size</a:t>
-            </a:r>
-          </a:p>
-          <a:p>
-            <a:r>
-              <a:rPr lang="en-US" b="1" dirty="0"/>
-              <a:t>Gen 1 heap </a:t>
-            </a:r>
-            <a:r>
-              <a:rPr lang="en-US" b="1" dirty="0" smtClean="0"/>
-              <a:t>size</a:t>
-            </a:r>
-          </a:p>
-          <a:p>
-            <a:r>
-              <a:rPr lang="en-US" b="1" dirty="0"/>
-              <a:t>Gen 2 heap </a:t>
-            </a:r>
-            <a:r>
-              <a:rPr lang="en-US" b="1" dirty="0" smtClean="0"/>
-              <a:t>size</a:t>
-            </a:r>
-          </a:p>
-          <a:p>
-            <a:r>
-              <a:rPr lang="en-US" b="1" dirty="0"/>
-              <a:t># Bytes in all Heaps</a:t>
-            </a:r>
-            <a:endParaRPr lang="en-US" dirty="0"/>
+            <a:pPr marL="0" indent="0" algn="ctr">
+              <a:buNone/>
+            </a:pPr>
+            <a:r>
+              <a:rPr lang="en-US" dirty="0" smtClean="0"/>
+              <a:t>Performance Counters Demo</a:t>
+            </a:r>
+          </a:p>
+          <a:p>
+            <a:pPr marL="0" indent="0" algn="ctr">
+              <a:buNone/>
+            </a:pPr>
+            <a:r>
+              <a:rPr lang="en-US" sz="1800" dirty="0">
+                <a:hlinkClick r:id="rId2"/>
+              </a:rPr>
+              <a:t>https://docs.microsoft.com/en-us/dotnet/framework/debug-trace-profile/performance-counters#memory</a:t>
+            </a:r>
+            <a:endParaRPr lang="en-US" sz="1800" dirty="0"/>
           </a:p>
         </p:txBody>
       </p:sp>
@@ -4770,7 +5515,7 @@
     </p:spTree>
     <p:extLst>
       <p:ext uri="{BB962C8B-B14F-4D97-AF65-F5344CB8AC3E}">
-        <p14:creationId xmlns:p14="http://schemas.microsoft.com/office/powerpoint/2010/main" val="896516955"/>
+        <p14:creationId xmlns:p14="http://schemas.microsoft.com/office/powerpoint/2010/main" val="2997955491"/>
       </p:ext>
     </p:extLst>
   </p:cSld>
@@ -5124,8 +5869,8 @@
           <a:lstStyle/>
           <a:p>
             <a:r>
-              <a:rPr lang="en-US" dirty="0" smtClean="0"/>
-              <a:t>Weak References</a:t>
+              <a:rPr lang="en-US" dirty="0" err="1" smtClean="0"/>
+              <a:t>WeakReferences</a:t>
             </a:r>
             <a:endParaRPr lang="en-US" dirty="0"/>
           </a:p>
@@ -5282,7 +6027,31 @@
             </a:pPr>
             <a:r>
               <a:rPr lang="en-US" sz="2400" dirty="0"/>
-              <a:t>A weak reference permits the garbage collector to collect the object while still allowing the application to access the object. A weak reference is valid only during the indeterminate amount of time until the object is collected when no strong references exist. When you use a weak reference, the application can still obtain a strong reference to the object, which prevents it from being collected. However, there is always the risk that the garbage collector will get to the object first before a strong reference is reestablished.</a:t>
+              <a:t>A weak reference </a:t>
+            </a:r>
+            <a:r>
+              <a:rPr lang="en-US" sz="2400" dirty="0">
+                <a:solidFill>
+                  <a:schemeClr val="accent6"/>
+                </a:solidFill>
+              </a:rPr>
+              <a:t>permits the garbage collector to collect the object </a:t>
+            </a:r>
+            <a:r>
+              <a:rPr lang="en-US" sz="2400" dirty="0"/>
+              <a:t>while still allowing the application to access the object. A weak reference is valid only during the indeterminate amount of time until the object is </a:t>
+            </a:r>
+            <a:r>
+              <a:rPr lang="en-US" sz="2400" dirty="0">
+                <a:solidFill>
+                  <a:schemeClr val="accent6"/>
+                </a:solidFill>
+              </a:rPr>
+              <a:t>collected when no strong references exist</a:t>
+            </a:r>
+            <a:r>
+              <a:rPr lang="en-US" sz="2400" dirty="0"/>
+              <a:t>. When you use a weak reference, the application can still obtain a strong reference to the object, which prevents it from being collected. However, there is always the risk that the garbage collector will get to the object first before a strong reference is reestablished.</a:t>
             </a:r>
           </a:p>
         </p:txBody>
@@ -5490,8 +6259,16 @@
           <a:lstStyle/>
           <a:p>
             <a:r>
+              <a:rPr lang="en-US" dirty="0" err="1" smtClean="0"/>
+              <a:t>WeakReferences</a:t>
+            </a:r>
+            <a:r>
               <a:rPr lang="en-US" dirty="0" smtClean="0"/>
-              <a:t>Weak References Demo</a:t>
+              <a:t> </a:t>
+            </a:r>
+            <a:r>
+              <a:rPr lang="en-US" dirty="0" smtClean="0"/>
+              <a:t>Demo</a:t>
             </a:r>
             <a:endParaRPr lang="en-US" dirty="0"/>
           </a:p>
@@ -5631,13 +6408,8 @@
           <a:p>
             <a:r>
               <a:rPr lang="en-US" dirty="0" smtClean="0"/>
-              <a:t>Do you feel like you </a:t>
-            </a:r>
-            <a:r>
-              <a:rPr lang="en-US" dirty="0" smtClean="0"/>
-              <a:t>know enough about .NET memory management to make good design choices?</a:t>
-            </a:r>
-            <a:endParaRPr lang="en-US" dirty="0" smtClean="0"/>
+              <a:t>Do you feel like you know enough about .NET memory management to make good design choices?</a:t>
+            </a:r>
           </a:p>
         </p:txBody>
       </p:sp>
@@ -5753,7 +6525,11 @@
             </a:pPr>
             <a:r>
               <a:rPr lang="en-US" dirty="0" smtClean="0"/>
-              <a:t>Specifically MS built this tech for compilers and WPF apps</a:t>
+              <a:t>FYI: MS </a:t>
+            </a:r>
+            <a:r>
+              <a:rPr lang="en-US" dirty="0" smtClean="0"/>
+              <a:t>built this tech for compilers and WPF apps</a:t>
             </a:r>
           </a:p>
           <a:p>
@@ -5767,7 +6543,7 @@
             </a:r>
             <a:r>
               <a:rPr lang="en-US" sz="1200" dirty="0">
-                <a:hlinkClick r:id="rId2"/>
+                <a:hlinkClick r:id="rId3"/>
               </a:rPr>
               <a:t>http://www.philosophicalgeek.com/2014/09/03/practical-uses-of-weakreference/</a:t>
             </a:r>
@@ -5837,7 +6613,26 @@
             </a:r>
             <a:r>
               <a:rPr lang="en-US" sz="2000" dirty="0"/>
-              <a:t>&lt;T&gt;</a:t>
+              <a:t>&lt;T</a:t>
+            </a:r>
+            <a:r>
+              <a:rPr lang="en-US" sz="2000" dirty="0" smtClean="0"/>
+              <a:t>&gt;</a:t>
+            </a:r>
+          </a:p>
+          <a:p>
+            <a:pPr marL="914400" lvl="1" indent="-514350">
+              <a:buAutoNum type="arabicPeriod"/>
+            </a:pPr>
+            <a:r>
+              <a:rPr lang="en-US" sz="2000" dirty="0" smtClean="0"/>
+              <a:t>Working with many event subscribers to a control’s events: </a:t>
+            </a:r>
+            <a:r>
+              <a:rPr lang="en-US" sz="2000" dirty="0">
+                <a:hlinkClick r:id="rId4"/>
+              </a:rPr>
+              <a:t>https://docs.microsoft.com/en-us/dotnet/framework/wpf/advanced/weak-event-patterns</a:t>
             </a:r>
             <a:endParaRPr lang="en-US" sz="2000" dirty="0" smtClean="0"/>
           </a:p>
@@ -6168,7 +6963,15 @@
           <a:p>
             <a:r>
               <a:rPr lang="en-US" dirty="0" smtClean="0"/>
-              <a:t>This is the process that runs that is converting used memory into available memory for you.</a:t>
+              <a:t>This is the process that runs that is converting </a:t>
+            </a:r>
+            <a:r>
+              <a:rPr lang="en-US" dirty="0" smtClean="0"/>
+              <a:t>used (not in use) </a:t>
+            </a:r>
+            <a:r>
+              <a:rPr lang="en-US" dirty="0" smtClean="0"/>
+              <a:t>memory into available memory for you.</a:t>
             </a:r>
           </a:p>
           <a:p>
@@ -6447,8 +7250,27 @@
             </a:pPr>
             <a:r>
               <a:rPr lang="en-US" i="1" dirty="0" smtClean="0"/>
-              <a:t>The SOH and the LOH</a:t>
-            </a:r>
+              <a:t>The SOH and the </a:t>
+            </a:r>
+            <a:r>
+              <a:rPr lang="en-US" i="1" dirty="0" smtClean="0"/>
+              <a:t>LOH</a:t>
+            </a:r>
+          </a:p>
+          <a:p>
+            <a:pPr>
+              <a:buFontTx/>
+              <a:buChar char="-"/>
+            </a:pPr>
+            <a:r>
+              <a:rPr lang="en-US" dirty="0" smtClean="0"/>
+              <a:t>By default Gen2 runs as a background process on servers and </a:t>
+            </a:r>
+            <a:r>
+              <a:rPr lang="en-US" dirty="0" smtClean="0"/>
+              <a:t>synchronously on clients.</a:t>
+            </a:r>
+            <a:endParaRPr lang="en-US" dirty="0" smtClean="0"/>
           </a:p>
           <a:p>
             <a:pPr>
@@ -6682,7 +7504,23 @@
           <a:p>
             <a:r>
               <a:rPr lang="en-US" dirty="0" smtClean="0"/>
-              <a:t>In order to maximize performance you want things to die in their first GC or live for the application lifetime in Gen2 </a:t>
+              <a:t>In order to maximize performance you want things to </a:t>
+            </a:r>
+            <a:r>
+              <a:rPr lang="en-US" dirty="0" smtClean="0"/>
+              <a:t>be removed </a:t>
+            </a:r>
+            <a:r>
+              <a:rPr lang="en-US" dirty="0" smtClean="0"/>
+              <a:t>in their first GC or </a:t>
+            </a:r>
+            <a:r>
+              <a:rPr lang="en-US" dirty="0" smtClean="0"/>
+              <a:t>survive </a:t>
+            </a:r>
+            <a:r>
+              <a:rPr lang="en-US" dirty="0" smtClean="0"/>
+              <a:t>for the application lifetime in Gen2 </a:t>
             </a:r>
           </a:p>
           <a:p>
@@ -6693,7 +7531,7 @@
             </a:r>
             <a:r>
               <a:rPr lang="en-US" sz="2000" dirty="0">
-                <a:hlinkClick r:id="rId2"/>
+                <a:hlinkClick r:id="rId3"/>
               </a:rPr>
               <a:t>https://www.infoq.com/presentations/bing-net-performance</a:t>
             </a:r>
@@ -7838,12 +8676,6 @@
 </file>
 
 <file path=customXml/item1.xml><?xml version="1.0" encoding="utf-8"?>
-<p:properties xmlns:p="http://schemas.microsoft.com/office/2006/metadata/properties" xmlns:xsi="http://www.w3.org/2001/XMLSchema-instance" xmlns:pc="http://schemas.microsoft.com/office/infopath/2007/PartnerControls">
-  <documentManagement/>
-</p:properties>
-</file>
-
-<file path=customXml/item2.xml><?xml version="1.0" encoding="utf-8"?>
 <ct:contentTypeSchema xmlns:ct="http://schemas.microsoft.com/office/2006/metadata/contentType" xmlns:ma="http://schemas.microsoft.com/office/2006/metadata/properties/metaAttributes" ct:_="" ma:_="" ma:contentTypeName="Document" ma:contentTypeID="0x010100E9DC47B056CC1441AFDC9513F43466ED" ma:contentTypeVersion="0" ma:contentTypeDescription="Create a new document." ma:contentTypeScope="" ma:versionID="c0938fb841b7b877525803fd383e6e38">
   <xsd:schema xmlns:xsd="http://www.w3.org/2001/XMLSchema" xmlns:xs="http://www.w3.org/2001/XMLSchema" xmlns:p="http://schemas.microsoft.com/office/2006/metadata/properties" targetNamespace="http://schemas.microsoft.com/office/2006/metadata/properties" ma:root="true" ma:fieldsID="c64490b4aec6201516c3a874156f37b2">
     <xsd:element name="properties">
@@ -7957,6 +8789,12 @@
 </ct:contentTypeSchema>
 </file>
 
+<file path=customXml/item2.xml><?xml version="1.0" encoding="utf-8"?>
+<p:properties xmlns:p="http://schemas.microsoft.com/office/2006/metadata/properties" xmlns:xsi="http://www.w3.org/2001/XMLSchema-instance" xmlns:pc="http://schemas.microsoft.com/office/infopath/2007/PartnerControls">
+  <documentManagement/>
+</p:properties>
+</file>
+
 <file path=customXml/item3.xml><?xml version="1.0" encoding="utf-8"?>
 <?mso-contentType ?>
 <FormTemplates xmlns="http://schemas.microsoft.com/sharepoint/v3/contenttype/forms">
@@ -7967,21 +8805,6 @@
 </file>
 
 <file path=customXml/itemProps1.xml><?xml version="1.0" encoding="utf-8"?>
-<ds:datastoreItem xmlns:ds="http://schemas.openxmlformats.org/officeDocument/2006/customXml" ds:itemID="{0D6EDC04-DECF-4C8D-9072-FD66C02D0C8E}">
-  <ds:schemaRefs>
-    <ds:schemaRef ds:uri="http://schemas.microsoft.com/office/2006/documentManagement/types"/>
-    <ds:schemaRef ds:uri="http://www.w3.org/XML/1998/namespace"/>
-    <ds:schemaRef ds:uri="http://purl.org/dc/terms/"/>
-    <ds:schemaRef ds:uri="http://schemas.microsoft.com/office/infopath/2007/PartnerControls"/>
-    <ds:schemaRef ds:uri="http://purl.org/dc/dcmitype/"/>
-    <ds:schemaRef ds:uri="http://schemas.openxmlformats.org/package/2006/metadata/core-properties"/>
-    <ds:schemaRef ds:uri="http://purl.org/dc/elements/1.1/"/>
-    <ds:schemaRef ds:uri="http://schemas.microsoft.com/office/2006/metadata/properties"/>
-  </ds:schemaRefs>
-</ds:datastoreItem>
-</file>
-
-<file path=customXml/itemProps2.xml><?xml version="1.0" encoding="utf-8"?>
 <ds:datastoreItem xmlns:ds="http://schemas.openxmlformats.org/officeDocument/2006/customXml" ds:itemID="{02DEF5BB-D3DA-4774-8992-62424CDAFFE8}">
   <ds:schemaRefs>
     <ds:schemaRef ds:uri="http://schemas.microsoft.com/office/2006/metadata/contentType"/>
@@ -7997,6 +8820,21 @@
 </ds:datastoreItem>
 </file>
 
+<file path=customXml/itemProps2.xml><?xml version="1.0" encoding="utf-8"?>
+<ds:datastoreItem xmlns:ds="http://schemas.openxmlformats.org/officeDocument/2006/customXml" ds:itemID="{0D6EDC04-DECF-4C8D-9072-FD66C02D0C8E}">
+  <ds:schemaRefs>
+    <ds:schemaRef ds:uri="http://schemas.microsoft.com/office/2006/documentManagement/types"/>
+    <ds:schemaRef ds:uri="http://www.w3.org/XML/1998/namespace"/>
+    <ds:schemaRef ds:uri="http://purl.org/dc/terms/"/>
+    <ds:schemaRef ds:uri="http://schemas.microsoft.com/office/infopath/2007/PartnerControls"/>
+    <ds:schemaRef ds:uri="http://purl.org/dc/dcmitype/"/>
+    <ds:schemaRef ds:uri="http://schemas.openxmlformats.org/package/2006/metadata/core-properties"/>
+    <ds:schemaRef ds:uri="http://purl.org/dc/elements/1.1/"/>
+    <ds:schemaRef ds:uri="http://schemas.microsoft.com/office/2006/metadata/properties"/>
+  </ds:schemaRefs>
+</ds:datastoreItem>
+</file>
+
 <file path=customXml/itemProps3.xml><?xml version="1.0" encoding="utf-8"?>
 <ds:datastoreItem xmlns:ds="http://schemas.openxmlformats.org/officeDocument/2006/customXml" ds:itemID="{FB9A5DA6-25F7-45C1-B327-6BA0D31B0664}">
   <ds:schemaRefs>

</xml_diff>